<commit_message>
update version of aframe to 1.7.{0,1}
</commit_message>
<xml_diff>
--- a/p03/A-frame-Boolean-operations.pptx
+++ b/p03/A-frame-Boolean-operations.pptx
@@ -207,7 +207,7 @@
           <a:p>
             <a:fld id="{FA1E3CD0-6E24-4AC0-945A-82AEC1490673}" type="datetimeFigureOut">
               <a:rPr lang="en-US" smtClean="0"/>
-              <a:t>5/20/2025</a:t>
+              <a:t>5/30/2025</a:t>
             </a:fld>
             <a:endParaRPr lang="en-US"/>
           </a:p>
@@ -605,7 +605,7 @@
           <a:p>
             <a:fld id="{846CE7D5-CF57-46EF-B807-FDD0502418D4}" type="datetimeFigureOut">
               <a:rPr lang="en-US" smtClean="0"/>
-              <a:t>5/20/2025</a:t>
+              <a:t>5/30/2025</a:t>
             </a:fld>
             <a:endParaRPr lang="en-US"/>
           </a:p>
@@ -775,7 +775,7 @@
           <a:p>
             <a:fld id="{846CE7D5-CF57-46EF-B807-FDD0502418D4}" type="datetimeFigureOut">
               <a:rPr lang="en-US" smtClean="0"/>
-              <a:t>5/20/2025</a:t>
+              <a:t>5/30/2025</a:t>
             </a:fld>
             <a:endParaRPr lang="en-US"/>
           </a:p>
@@ -955,7 +955,7 @@
           <a:p>
             <a:fld id="{846CE7D5-CF57-46EF-B807-FDD0502418D4}" type="datetimeFigureOut">
               <a:rPr lang="en-US" smtClean="0"/>
-              <a:t>5/20/2025</a:t>
+              <a:t>5/30/2025</a:t>
             </a:fld>
             <a:endParaRPr lang="en-US"/>
           </a:p>
@@ -1125,7 +1125,7 @@
           <a:p>
             <a:fld id="{846CE7D5-CF57-46EF-B807-FDD0502418D4}" type="datetimeFigureOut">
               <a:rPr lang="en-US" smtClean="0"/>
-              <a:t>5/20/2025</a:t>
+              <a:t>5/30/2025</a:t>
             </a:fld>
             <a:endParaRPr lang="en-US"/>
           </a:p>
@@ -1371,7 +1371,7 @@
           <a:p>
             <a:fld id="{846CE7D5-CF57-46EF-B807-FDD0502418D4}" type="datetimeFigureOut">
               <a:rPr lang="en-US" smtClean="0"/>
-              <a:t>5/20/2025</a:t>
+              <a:t>5/30/2025</a:t>
             </a:fld>
             <a:endParaRPr lang="en-US"/>
           </a:p>
@@ -1603,7 +1603,7 @@
           <a:p>
             <a:fld id="{846CE7D5-CF57-46EF-B807-FDD0502418D4}" type="datetimeFigureOut">
               <a:rPr lang="en-US" smtClean="0"/>
-              <a:t>5/20/2025</a:t>
+              <a:t>5/30/2025</a:t>
             </a:fld>
             <a:endParaRPr lang="en-US"/>
           </a:p>
@@ -1970,7 +1970,7 @@
           <a:p>
             <a:fld id="{846CE7D5-CF57-46EF-B807-FDD0502418D4}" type="datetimeFigureOut">
               <a:rPr lang="en-US" smtClean="0"/>
-              <a:t>5/20/2025</a:t>
+              <a:t>5/30/2025</a:t>
             </a:fld>
             <a:endParaRPr lang="en-US"/>
           </a:p>
@@ -2088,7 +2088,7 @@
           <a:p>
             <a:fld id="{846CE7D5-CF57-46EF-B807-FDD0502418D4}" type="datetimeFigureOut">
               <a:rPr lang="en-US" smtClean="0"/>
-              <a:t>5/20/2025</a:t>
+              <a:t>5/30/2025</a:t>
             </a:fld>
             <a:endParaRPr lang="en-US"/>
           </a:p>
@@ -2183,7 +2183,7 @@
           <a:p>
             <a:fld id="{846CE7D5-CF57-46EF-B807-FDD0502418D4}" type="datetimeFigureOut">
               <a:rPr lang="en-US" smtClean="0"/>
-              <a:t>5/20/2025</a:t>
+              <a:t>5/30/2025</a:t>
             </a:fld>
             <a:endParaRPr lang="en-US"/>
           </a:p>
@@ -2460,7 +2460,7 @@
           <a:p>
             <a:fld id="{846CE7D5-CF57-46EF-B807-FDD0502418D4}" type="datetimeFigureOut">
               <a:rPr lang="en-US" smtClean="0"/>
-              <a:t>5/20/2025</a:t>
+              <a:t>5/30/2025</a:t>
             </a:fld>
             <a:endParaRPr lang="en-US"/>
           </a:p>
@@ -2717,7 +2717,7 @@
           <a:p>
             <a:fld id="{846CE7D5-CF57-46EF-B807-FDD0502418D4}" type="datetimeFigureOut">
               <a:rPr lang="en-US" smtClean="0"/>
-              <a:t>5/20/2025</a:t>
+              <a:t>5/30/2025</a:t>
             </a:fld>
             <a:endParaRPr lang="en-US"/>
           </a:p>
@@ -2930,7 +2930,7 @@
           <a:p>
             <a:fld id="{846CE7D5-CF57-46EF-B807-FDD0502418D4}" type="datetimeFigureOut">
               <a:rPr lang="en-US" smtClean="0"/>
-              <a:t>5/20/2025</a:t>
+              <a:t>5/30/2025</a:t>
             </a:fld>
             <a:endParaRPr lang="en-US"/>
           </a:p>

</xml_diff>